<commit_message>
file cleanup and run setup with coef1 = 5e+16, not 5e+17 -> lower met costs. also min allocation for behav with equal fitness is optimal now.
</commit_message>
<xml_diff>
--- a/seasonal results August2019.pptx
+++ b/seasonal results August2019.pptx
@@ -6,6 +6,9 @@
   </p:sldMasterIdLst>
   <p:sldIdLst>
     <p:sldId id="256" r:id="rId2"/>
+    <p:sldId id="257" r:id="rId3"/>
+    <p:sldId id="258" r:id="rId4"/>
+    <p:sldId id="259" r:id="rId5"/>
   </p:sldIdLst>
   <p:sldSz cx="12192000" cy="6858000"/>
   <p:notesSz cx="6858000" cy="9144000"/>
@@ -104,6 +107,11 @@
       </a:defRPr>
     </a:lvl9pPr>
   </p:defaultTextStyle>
+  <p:extLst>
+    <p:ext uri="{EFAFB233-063F-42B5-8137-9DF3F51BA10A}">
+      <p15:sldGuideLst xmlns:p15="http://schemas.microsoft.com/office/powerpoint/2012/main"/>
+    </p:ext>
+  </p:extLst>
 </p:presentation>
 </file>
 
@@ -254,7 +262,7 @@
           <a:p>
             <a:fld id="{55241B5A-D74B-9F46-8717-6B8353527521}" type="datetimeFigureOut">
               <a:rPr lang="en-US" smtClean="0"/>
-              <a:t>8/12/19</a:t>
+              <a:t>8/15/19</a:t>
             </a:fld>
             <a:endParaRPr lang="en-US"/>
           </a:p>
@@ -452,7 +460,7 @@
           <a:p>
             <a:fld id="{55241B5A-D74B-9F46-8717-6B8353527521}" type="datetimeFigureOut">
               <a:rPr lang="en-US" smtClean="0"/>
-              <a:t>8/12/19</a:t>
+              <a:t>8/15/19</a:t>
             </a:fld>
             <a:endParaRPr lang="en-US"/>
           </a:p>
@@ -660,7 +668,7 @@
           <a:p>
             <a:fld id="{55241B5A-D74B-9F46-8717-6B8353527521}" type="datetimeFigureOut">
               <a:rPr lang="en-US" smtClean="0"/>
-              <a:t>8/12/19</a:t>
+              <a:t>8/15/19</a:t>
             </a:fld>
             <a:endParaRPr lang="en-US"/>
           </a:p>
@@ -858,7 +866,7 @@
           <a:p>
             <a:fld id="{55241B5A-D74B-9F46-8717-6B8353527521}" type="datetimeFigureOut">
               <a:rPr lang="en-US" smtClean="0"/>
-              <a:t>8/12/19</a:t>
+              <a:t>8/15/19</a:t>
             </a:fld>
             <a:endParaRPr lang="en-US"/>
           </a:p>
@@ -1133,7 +1141,7 @@
           <a:p>
             <a:fld id="{55241B5A-D74B-9F46-8717-6B8353527521}" type="datetimeFigureOut">
               <a:rPr lang="en-US" smtClean="0"/>
-              <a:t>8/12/19</a:t>
+              <a:t>8/15/19</a:t>
             </a:fld>
             <a:endParaRPr lang="en-US"/>
           </a:p>
@@ -1398,7 +1406,7 @@
           <a:p>
             <a:fld id="{55241B5A-D74B-9F46-8717-6B8353527521}" type="datetimeFigureOut">
               <a:rPr lang="en-US" smtClean="0"/>
-              <a:t>8/12/19</a:t>
+              <a:t>8/15/19</a:t>
             </a:fld>
             <a:endParaRPr lang="en-US"/>
           </a:p>
@@ -1810,7 +1818,7 @@
           <a:p>
             <a:fld id="{55241B5A-D74B-9F46-8717-6B8353527521}" type="datetimeFigureOut">
               <a:rPr lang="en-US" smtClean="0"/>
-              <a:t>8/12/19</a:t>
+              <a:t>8/15/19</a:t>
             </a:fld>
             <a:endParaRPr lang="en-US"/>
           </a:p>
@@ -1951,7 +1959,7 @@
           <a:p>
             <a:fld id="{55241B5A-D74B-9F46-8717-6B8353527521}" type="datetimeFigureOut">
               <a:rPr lang="en-US" smtClean="0"/>
-              <a:t>8/12/19</a:t>
+              <a:t>8/15/19</a:t>
             </a:fld>
             <a:endParaRPr lang="en-US"/>
           </a:p>
@@ -2064,7 +2072,7 @@
           <a:p>
             <a:fld id="{55241B5A-D74B-9F46-8717-6B8353527521}" type="datetimeFigureOut">
               <a:rPr lang="en-US" smtClean="0"/>
-              <a:t>8/12/19</a:t>
+              <a:t>8/15/19</a:t>
             </a:fld>
             <a:endParaRPr lang="en-US"/>
           </a:p>
@@ -2375,7 +2383,7 @@
           <a:p>
             <a:fld id="{55241B5A-D74B-9F46-8717-6B8353527521}" type="datetimeFigureOut">
               <a:rPr lang="en-US" smtClean="0"/>
-              <a:t>8/12/19</a:t>
+              <a:t>8/15/19</a:t>
             </a:fld>
             <a:endParaRPr lang="en-US"/>
           </a:p>
@@ -2663,7 +2671,7 @@
           <a:p>
             <a:fld id="{55241B5A-D74B-9F46-8717-6B8353527521}" type="datetimeFigureOut">
               <a:rPr lang="en-US" smtClean="0"/>
-              <a:t>8/12/19</a:t>
+              <a:t>8/15/19</a:t>
             </a:fld>
             <a:endParaRPr lang="en-US"/>
           </a:p>
@@ -2904,7 +2912,7 @@
           <a:p>
             <a:fld id="{55241B5A-D74B-9F46-8717-6B8353527521}" type="datetimeFigureOut">
               <a:rPr lang="en-US" smtClean="0"/>
-              <a:t>8/12/19</a:t>
+              <a:t>8/15/19</a:t>
             </a:fld>
             <a:endParaRPr lang="en-US"/>
           </a:p>
@@ -3381,10 +3389,220 @@
           </a:prstGeom>
         </p:spPr>
       </p:pic>
+      <p:pic>
+        <p:nvPicPr>
+          <p:cNvPr id="3" name="Picture 2">
+            <a:extLst>
+              <a:ext uri="{FF2B5EF4-FFF2-40B4-BE49-F238E27FC236}">
+                <a16:creationId xmlns:a16="http://schemas.microsoft.com/office/drawing/2014/main" id="{76BAAD35-7EC2-5046-A6AE-5373D3032D90}"/>
+              </a:ext>
+            </a:extLst>
+          </p:cNvPr>
+          <p:cNvPicPr>
+            <a:picLocks noChangeAspect="1"/>
+          </p:cNvPicPr>
+          <p:nvPr/>
+        </p:nvPicPr>
+        <p:blipFill>
+          <a:blip r:link="rId2"/>
+          <a:stretch>
+            <a:fillRect/>
+          </a:stretch>
+        </p:blipFill>
+        <p:spPr>
+          <a:xfrm>
+            <a:off x="1270000" y="1270000"/>
+            <a:ext cx="63500" cy="76200"/>
+          </a:xfrm>
+          <a:prstGeom prst="rect">
+            <a:avLst/>
+          </a:prstGeom>
+        </p:spPr>
+      </p:pic>
     </p:spTree>
     <p:extLst>
       <p:ext uri="{BB962C8B-B14F-4D97-AF65-F5344CB8AC3E}">
         <p14:creationId xmlns:p14="http://schemas.microsoft.com/office/powerpoint/2010/main" val="4061923790"/>
+      </p:ext>
+    </p:extLst>
+  </p:cSld>
+  <p:clrMapOvr>
+    <a:masterClrMapping/>
+  </p:clrMapOvr>
+</p:sld>
+</file>
+
+<file path=ppt/slides/slide2.xml><?xml version="1.0" encoding="utf-8"?>
+<p:sld xmlns:a="http://schemas.openxmlformats.org/drawingml/2006/main" xmlns:r="http://schemas.openxmlformats.org/officeDocument/2006/relationships" xmlns:p="http://schemas.openxmlformats.org/presentationml/2006/main">
+  <p:cSld>
+    <p:spTree>
+      <p:nvGrpSpPr>
+        <p:cNvPr id="1" name=""/>
+        <p:cNvGrpSpPr/>
+        <p:nvPr/>
+      </p:nvGrpSpPr>
+      <p:grpSpPr>
+        <a:xfrm>
+          <a:off x="0" y="0"/>
+          <a:ext cx="0" cy="0"/>
+          <a:chOff x="0" y="0"/>
+          <a:chExt cx="0" cy="0"/>
+        </a:xfrm>
+      </p:grpSpPr>
+      <p:pic>
+        <p:nvPicPr>
+          <p:cNvPr id="2" name="Picture 1">
+            <a:extLst>
+              <a:ext uri="{FF2B5EF4-FFF2-40B4-BE49-F238E27FC236}">
+                <a16:creationId xmlns:a16="http://schemas.microsoft.com/office/drawing/2014/main" id="{B1C1FFE9-A660-6B41-9E9C-11871043AC2C}"/>
+              </a:ext>
+            </a:extLst>
+          </p:cNvPr>
+          <p:cNvPicPr>
+            <a:picLocks noChangeAspect="1"/>
+          </p:cNvPicPr>
+          <p:nvPr/>
+        </p:nvPicPr>
+        <p:blipFill>
+          <a:blip r:embed="rId2"/>
+          <a:stretch>
+            <a:fillRect/>
+          </a:stretch>
+        </p:blipFill>
+        <p:spPr>
+          <a:xfrm>
+            <a:off x="2895600" y="228600"/>
+            <a:ext cx="6400800" cy="6400800"/>
+          </a:xfrm>
+          <a:prstGeom prst="rect">
+            <a:avLst/>
+          </a:prstGeom>
+        </p:spPr>
+      </p:pic>
+    </p:spTree>
+    <p:extLst>
+      <p:ext uri="{BB962C8B-B14F-4D97-AF65-F5344CB8AC3E}">
+        <p14:creationId xmlns:p14="http://schemas.microsoft.com/office/powerpoint/2010/main" val="2956562114"/>
+      </p:ext>
+    </p:extLst>
+  </p:cSld>
+  <p:clrMapOvr>
+    <a:masterClrMapping/>
+  </p:clrMapOvr>
+</p:sld>
+</file>
+
+<file path=ppt/slides/slide3.xml><?xml version="1.0" encoding="utf-8"?>
+<p:sld xmlns:a="http://schemas.openxmlformats.org/drawingml/2006/main" xmlns:r="http://schemas.openxmlformats.org/officeDocument/2006/relationships" xmlns:p="http://schemas.openxmlformats.org/presentationml/2006/main">
+  <p:cSld>
+    <p:spTree>
+      <p:nvGrpSpPr>
+        <p:cNvPr id="1" name=""/>
+        <p:cNvGrpSpPr/>
+        <p:nvPr/>
+      </p:nvGrpSpPr>
+      <p:grpSpPr>
+        <a:xfrm>
+          <a:off x="0" y="0"/>
+          <a:ext cx="0" cy="0"/>
+          <a:chOff x="0" y="0"/>
+          <a:chExt cx="0" cy="0"/>
+        </a:xfrm>
+      </p:grpSpPr>
+      <p:pic>
+        <p:nvPicPr>
+          <p:cNvPr id="2" name="Picture 1">
+            <a:extLst>
+              <a:ext uri="{FF2B5EF4-FFF2-40B4-BE49-F238E27FC236}">
+                <a16:creationId xmlns:a16="http://schemas.microsoft.com/office/drawing/2014/main" id="{F373A54E-E02C-2B44-989C-7D17FF881047}"/>
+              </a:ext>
+            </a:extLst>
+          </p:cNvPr>
+          <p:cNvPicPr>
+            <a:picLocks noChangeAspect="1"/>
+          </p:cNvPicPr>
+          <p:nvPr/>
+        </p:nvPicPr>
+        <p:blipFill>
+          <a:blip r:embed="rId2"/>
+          <a:stretch>
+            <a:fillRect/>
+          </a:stretch>
+        </p:blipFill>
+        <p:spPr>
+          <a:xfrm>
+            <a:off x="2895600" y="228600"/>
+            <a:ext cx="6400800" cy="6400800"/>
+          </a:xfrm>
+          <a:prstGeom prst="rect">
+            <a:avLst/>
+          </a:prstGeom>
+        </p:spPr>
+      </p:pic>
+    </p:spTree>
+    <p:extLst>
+      <p:ext uri="{BB962C8B-B14F-4D97-AF65-F5344CB8AC3E}">
+        <p14:creationId xmlns:p14="http://schemas.microsoft.com/office/powerpoint/2010/main" val="4179845486"/>
+      </p:ext>
+    </p:extLst>
+  </p:cSld>
+  <p:clrMapOvr>
+    <a:masterClrMapping/>
+  </p:clrMapOvr>
+</p:sld>
+</file>
+
+<file path=ppt/slides/slide4.xml><?xml version="1.0" encoding="utf-8"?>
+<p:sld xmlns:a="http://schemas.openxmlformats.org/drawingml/2006/main" xmlns:r="http://schemas.openxmlformats.org/officeDocument/2006/relationships" xmlns:p="http://schemas.openxmlformats.org/presentationml/2006/main">
+  <p:cSld>
+    <p:spTree>
+      <p:nvGrpSpPr>
+        <p:cNvPr id="1" name=""/>
+        <p:cNvGrpSpPr/>
+        <p:nvPr/>
+      </p:nvGrpSpPr>
+      <p:grpSpPr>
+        <a:xfrm>
+          <a:off x="0" y="0"/>
+          <a:ext cx="0" cy="0"/>
+          <a:chOff x="0" y="0"/>
+          <a:chExt cx="0" cy="0"/>
+        </a:xfrm>
+      </p:grpSpPr>
+      <p:pic>
+        <p:nvPicPr>
+          <p:cNvPr id="2" name="Picture 1">
+            <a:extLst>
+              <a:ext uri="{FF2B5EF4-FFF2-40B4-BE49-F238E27FC236}">
+                <a16:creationId xmlns:a16="http://schemas.microsoft.com/office/drawing/2014/main" id="{CD08D19C-CA1F-A54D-8B16-3357D115E52D}"/>
+              </a:ext>
+            </a:extLst>
+          </p:cNvPr>
+          <p:cNvPicPr>
+            <a:picLocks noChangeAspect="1"/>
+          </p:cNvPicPr>
+          <p:nvPr/>
+        </p:nvPicPr>
+        <p:blipFill>
+          <a:blip r:embed="rId2"/>
+          <a:stretch>
+            <a:fillRect/>
+          </a:stretch>
+        </p:blipFill>
+        <p:spPr>
+          <a:xfrm>
+            <a:off x="2895600" y="228600"/>
+            <a:ext cx="6400800" cy="6400800"/>
+          </a:xfrm>
+          <a:prstGeom prst="rect">
+            <a:avLst/>
+          </a:prstGeom>
+        </p:spPr>
+      </p:pic>
+    </p:spTree>
+    <p:extLst>
+      <p:ext uri="{BB962C8B-B14F-4D97-AF65-F5344CB8AC3E}">
+        <p14:creationId xmlns:p14="http://schemas.microsoft.com/office/powerpoint/2010/main" val="2285891589"/>
       </p:ext>
     </p:extLst>
   </p:cSld>

</xml_diff>